<commit_message>
music city code 2017
</commit_message>
<xml_diff>
--- a/SerilogLoggingAllGrownUp.pptx
+++ b/SerilogLoggingAllGrownUp.pptx
@@ -5,7 +5,7 @@
     <p:sldMasterId id="2147483648" r:id="rId1"/>
   </p:sldMasterIdLst>
   <p:notesMasterIdLst>
-    <p:notesMasterId r:id="rId18"/>
+    <p:notesMasterId r:id="rId19"/>
   </p:notesMasterIdLst>
   <p:sldIdLst>
     <p:sldId id="256" r:id="rId2"/>
@@ -23,7 +23,8 @@
     <p:sldId id="268" r:id="rId14"/>
     <p:sldId id="269" r:id="rId15"/>
     <p:sldId id="270" r:id="rId16"/>
-    <p:sldId id="271" r:id="rId17"/>
+    <p:sldId id="272" r:id="rId17"/>
+    <p:sldId id="271" r:id="rId18"/>
   </p:sldIdLst>
   <p:sldSz cx="12192000" cy="6858000"/>
   <p:notesSz cx="6858000" cy="9144000"/>
@@ -122,7 +123,16 @@
       </a:defRPr>
     </a:lvl9pPr>
   </p:defaultTextStyle>
+  <p:extLst>
+    <p:ext uri="{EFAFB233-063F-42B5-8137-9DF3F51BA10A}">
+      <p15:sldGuideLst xmlns:p15="http://schemas.microsoft.com/office/powerpoint/2012/main"/>
+    </p:ext>
+  </p:extLst>
 </p:presentation>
+</file>
+
+<file path=ppt/revisionInfo.xml><?xml version="1.0" encoding="utf-8"?>
+<p1510:revInfo xmlns:a="http://schemas.openxmlformats.org/drawingml/2006/main" xmlns:r="http://schemas.openxmlformats.org/officeDocument/2006/relationships" xmlns:p1510="http://schemas.microsoft.com/office/powerpoint/2015/10/main"/>
 </file>
 
 <file path=ppt/notesMasters/notesMaster1.xml><?xml version="1.0" encoding="utf-8"?>
@@ -207,7 +217,7 @@
           <a:p>
             <a:fld id="{60AEC1D8-3506-41E4-96D2-5486DC5DE0A5}" type="datetimeFigureOut">
               <a:rPr lang="en-US" smtClean="0"/>
-              <a:t>6/2/2017</a:t>
+              <a:t>10/16/2017</a:t>
             </a:fld>
             <a:endParaRPr lang="en-US"/>
           </a:p>
@@ -706,7 +716,7 @@
           <a:p>
             <a:fld id="{48A87A34-81AB-432B-8DAE-1953F412C126}" type="datetimeFigureOut">
               <a:rPr lang="en-US" dirty="0"/>
-              <a:t>6/2/2017</a:t>
+              <a:t>10/16/2017</a:t>
             </a:fld>
             <a:endParaRPr lang="en-US" dirty="0"/>
           </a:p>
@@ -988,7 +998,7 @@
           <a:p>
             <a:fld id="{48A87A34-81AB-432B-8DAE-1953F412C126}" type="datetimeFigureOut">
               <a:rPr lang="en-US" dirty="0"/>
-              <a:t>6/2/2017</a:t>
+              <a:t>10/16/2017</a:t>
             </a:fld>
             <a:endParaRPr lang="en-US" dirty="0"/>
           </a:p>
@@ -1175,7 +1185,7 @@
           <a:p>
             <a:fld id="{48A87A34-81AB-432B-8DAE-1953F412C126}" type="datetimeFigureOut">
               <a:rPr lang="en-US" dirty="0"/>
-              <a:t>6/2/2017</a:t>
+              <a:t>10/16/2017</a:t>
             </a:fld>
             <a:endParaRPr lang="en-US" dirty="0"/>
           </a:p>
@@ -1431,7 +1441,7 @@
           <a:p>
             <a:fld id="{48A87A34-81AB-432B-8DAE-1953F412C126}" type="datetimeFigureOut">
               <a:rPr lang="en-US" dirty="0"/>
-              <a:t>6/2/2017</a:t>
+              <a:t>10/16/2017</a:t>
             </a:fld>
             <a:endParaRPr lang="en-US" dirty="0"/>
           </a:p>
@@ -1850,7 +1860,7 @@
           <a:p>
             <a:fld id="{48A87A34-81AB-432B-8DAE-1953F412C126}" type="datetimeFigureOut">
               <a:rPr lang="en-US" dirty="0"/>
-              <a:t>6/2/2017</a:t>
+              <a:t>10/16/2017</a:t>
             </a:fld>
             <a:endParaRPr lang="en-US" dirty="0"/>
           </a:p>
@@ -2391,7 +2401,7 @@
           <a:p>
             <a:fld id="{48A87A34-81AB-432B-8DAE-1953F412C126}" type="datetimeFigureOut">
               <a:rPr lang="en-US" dirty="0"/>
-              <a:t>6/2/2017</a:t>
+              <a:t>10/16/2017</a:t>
             </a:fld>
             <a:endParaRPr lang="en-US" dirty="0"/>
           </a:p>
@@ -3226,7 +3236,7 @@
           <a:p>
             <a:fld id="{48A87A34-81AB-432B-8DAE-1953F412C126}" type="datetimeFigureOut">
               <a:rPr lang="en-US" dirty="0"/>
-              <a:t>6/2/2017</a:t>
+              <a:t>10/16/2017</a:t>
             </a:fld>
             <a:endParaRPr lang="en-US" dirty="0"/>
           </a:p>
@@ -3391,7 +3401,7 @@
           <a:p>
             <a:fld id="{48A87A34-81AB-432B-8DAE-1953F412C126}" type="datetimeFigureOut">
               <a:rPr lang="en-US" dirty="0"/>
-              <a:t>6/2/2017</a:t>
+              <a:t>10/16/2017</a:t>
             </a:fld>
             <a:endParaRPr lang="en-US" dirty="0"/>
           </a:p>
@@ -3570,7 +3580,7 @@
           <a:p>
             <a:fld id="{48A87A34-81AB-432B-8DAE-1953F412C126}" type="datetimeFigureOut">
               <a:rPr lang="en-US" dirty="0"/>
-              <a:t>6/2/2017</a:t>
+              <a:t>10/16/2017</a:t>
             </a:fld>
             <a:endParaRPr lang="en-US" dirty="0"/>
           </a:p>
@@ -3735,7 +3745,7 @@
           <a:p>
             <a:fld id="{48A87A34-81AB-432B-8DAE-1953F412C126}" type="datetimeFigureOut">
               <a:rPr lang="en-US" dirty="0"/>
-              <a:t>6/2/2017</a:t>
+              <a:t>10/16/2017</a:t>
             </a:fld>
             <a:endParaRPr lang="en-US" dirty="0"/>
           </a:p>
@@ -3978,7 +3988,7 @@
           <a:p>
             <a:fld id="{48A87A34-81AB-432B-8DAE-1953F412C126}" type="datetimeFigureOut">
               <a:rPr lang="en-US" dirty="0"/>
-              <a:t>6/2/2017</a:t>
+              <a:t>10/16/2017</a:t>
             </a:fld>
             <a:endParaRPr lang="en-US" dirty="0"/>
           </a:p>
@@ -4210,7 +4220,7 @@
           <a:p>
             <a:fld id="{48A87A34-81AB-432B-8DAE-1953F412C126}" type="datetimeFigureOut">
               <a:rPr lang="en-US" dirty="0"/>
-              <a:t>6/2/2017</a:t>
+              <a:t>10/16/2017</a:t>
             </a:fld>
             <a:endParaRPr lang="en-US" dirty="0"/>
           </a:p>
@@ -4578,7 +4588,7 @@
           <a:p>
             <a:fld id="{48A87A34-81AB-432B-8DAE-1953F412C126}" type="datetimeFigureOut">
               <a:rPr lang="en-US" dirty="0"/>
-              <a:t>6/2/2017</a:t>
+              <a:t>10/16/2017</a:t>
             </a:fld>
             <a:endParaRPr lang="en-US" dirty="0"/>
           </a:p>
@@ -4691,7 +4701,7 @@
           <a:p>
             <a:fld id="{48A87A34-81AB-432B-8DAE-1953F412C126}" type="datetimeFigureOut">
               <a:rPr lang="en-US" dirty="0"/>
-              <a:t>6/2/2017</a:t>
+              <a:t>10/16/2017</a:t>
             </a:fld>
             <a:endParaRPr lang="en-US" dirty="0"/>
           </a:p>
@@ -4781,7 +4791,7 @@
           <a:p>
             <a:fld id="{48A87A34-81AB-432B-8DAE-1953F412C126}" type="datetimeFigureOut">
               <a:rPr lang="en-US" dirty="0"/>
-              <a:t>6/2/2017</a:t>
+              <a:t>10/16/2017</a:t>
             </a:fld>
             <a:endParaRPr lang="en-US" dirty="0"/>
           </a:p>
@@ -5027,7 +5037,7 @@
           <a:p>
             <a:fld id="{48A87A34-81AB-432B-8DAE-1953F412C126}" type="datetimeFigureOut">
               <a:rPr lang="en-US" dirty="0"/>
-              <a:t>6/2/2017</a:t>
+              <a:t>10/16/2017</a:t>
             </a:fld>
             <a:endParaRPr lang="en-US" dirty="0"/>
           </a:p>
@@ -5309,7 +5319,7 @@
           <a:p>
             <a:fld id="{48A87A34-81AB-432B-8DAE-1953F412C126}" type="datetimeFigureOut">
               <a:rPr lang="en-US" dirty="0"/>
-              <a:t>6/2/2017</a:t>
+              <a:t>10/16/2017</a:t>
             </a:fld>
             <a:endParaRPr lang="en-US" dirty="0"/>
           </a:p>
@@ -5518,7 +5528,7 @@
             <a:fld id="{48A87A34-81AB-432B-8DAE-1953F412C126}" type="datetimeFigureOut">
               <a:rPr lang="en-US" dirty="0"/>
               <a:pPr/>
-              <a:t>6/2/2017</a:t>
+              <a:t>10/16/2017</a:t>
             </a:fld>
             <a:endParaRPr lang="en-US" dirty="0"/>
           </a:p>
@@ -7174,6 +7184,104 @@
       </p:grpSpPr>
       <p:sp>
         <p:nvSpPr>
+          <p:cNvPr id="2" name="Title 1">
+            <a:extLst>
+              <a:ext uri="{FF2B5EF4-FFF2-40B4-BE49-F238E27FC236}">
+                <a16:creationId xmlns:a16="http://schemas.microsoft.com/office/drawing/2014/main" id="{43A22611-D248-4AF1-BDD8-D7DD2AE6E1FA}"/>
+              </a:ext>
+            </a:extLst>
+          </p:cNvPr>
+          <p:cNvSpPr>
+            <a:spLocks noGrp="1"/>
+          </p:cNvSpPr>
+          <p:nvPr>
+            <p:ph type="title"/>
+          </p:nvPr>
+        </p:nvSpPr>
+        <p:spPr/>
+        <p:txBody>
+          <a:bodyPr/>
+          <a:lstStyle/>
+          <a:p>
+            <a:r>
+              <a:rPr lang="en-US" dirty="0"/>
+              <a:t>Advanced</a:t>
+            </a:r>
+          </a:p>
+        </p:txBody>
+      </p:sp>
+      <p:sp>
+        <p:nvSpPr>
+          <p:cNvPr id="3" name="Content Placeholder 2">
+            <a:extLst>
+              <a:ext uri="{FF2B5EF4-FFF2-40B4-BE49-F238E27FC236}">
+                <a16:creationId xmlns:a16="http://schemas.microsoft.com/office/drawing/2014/main" id="{8C297872-6461-40BD-877E-06F6B14B9C4D}"/>
+              </a:ext>
+            </a:extLst>
+          </p:cNvPr>
+          <p:cNvSpPr>
+            <a:spLocks noGrp="1"/>
+          </p:cNvSpPr>
+          <p:nvPr>
+            <p:ph idx="1"/>
+          </p:nvPr>
+        </p:nvSpPr>
+        <p:spPr/>
+        <p:txBody>
+          <a:bodyPr/>
+          <a:lstStyle/>
+          <a:p>
+            <a:r>
+              <a:rPr lang="en-US" dirty="0"/>
+              <a:t>.NET Core &amp; ASP .NET Core</a:t>
+            </a:r>
+          </a:p>
+          <a:p>
+            <a:r>
+              <a:rPr lang="en-US" dirty="0"/>
+              <a:t>Asynchronous Logging</a:t>
+            </a:r>
+          </a:p>
+          <a:p>
+            <a:endParaRPr lang="en-US" dirty="0"/>
+          </a:p>
+          <a:p>
+            <a:endParaRPr lang="en-US" dirty="0"/>
+          </a:p>
+        </p:txBody>
+      </p:sp>
+    </p:spTree>
+    <p:extLst>
+      <p:ext uri="{BB962C8B-B14F-4D97-AF65-F5344CB8AC3E}">
+        <p14:creationId xmlns:p14="http://schemas.microsoft.com/office/powerpoint/2010/main" val="3827409751"/>
+      </p:ext>
+    </p:extLst>
+  </p:cSld>
+  <p:clrMapOvr>
+    <a:masterClrMapping/>
+  </p:clrMapOvr>
+</p:sld>
+</file>
+
+<file path=ppt/slides/slide17.xml><?xml version="1.0" encoding="utf-8"?>
+<p:sld xmlns:a="http://schemas.openxmlformats.org/drawingml/2006/main" xmlns:r="http://schemas.openxmlformats.org/officeDocument/2006/relationships" xmlns:p="http://schemas.openxmlformats.org/presentationml/2006/main">
+  <p:cSld>
+    <p:spTree>
+      <p:nvGrpSpPr>
+        <p:cNvPr id="1" name=""/>
+        <p:cNvGrpSpPr/>
+        <p:nvPr/>
+      </p:nvGrpSpPr>
+      <p:grpSpPr>
+        <a:xfrm>
+          <a:off x="0" y="0"/>
+          <a:ext cx="0" cy="0"/>
+          <a:chOff x="0" y="0"/>
+          <a:chExt cx="0" cy="0"/>
+        </a:xfrm>
+      </p:grpSpPr>
+      <p:sp>
+        <p:nvSpPr>
           <p:cNvPr id="2" name="Title 1"/>
           <p:cNvSpPr>
             <a:spLocks noGrp="1"/>
@@ -7265,7 +7373,13 @@
       </p:grpSpPr>
       <p:pic>
         <p:nvPicPr>
-          <p:cNvPr id="5" name="Picture 4"/>
+          <p:cNvPr id="3" name="Picture 2">
+            <a:extLst>
+              <a:ext uri="{FF2B5EF4-FFF2-40B4-BE49-F238E27FC236}">
+                <a16:creationId xmlns:a16="http://schemas.microsoft.com/office/drawing/2014/main" id="{2F8FAD69-0844-4C5D-913F-136B2D2D50C7}"/>
+              </a:ext>
+            </a:extLst>
+          </p:cNvPr>
           <p:cNvPicPr>
             <a:picLocks noChangeAspect="1"/>
           </p:cNvPicPr>
@@ -7279,8 +7393,8 @@
         </p:blipFill>
         <p:spPr>
           <a:xfrm>
-            <a:off x="1524000" y="857250"/>
-            <a:ext cx="9144000" cy="5143500"/>
+            <a:off x="0" y="0"/>
+            <a:ext cx="12192000" cy="6858000"/>
           </a:xfrm>
           <a:prstGeom prst="rect">
             <a:avLst/>
@@ -7351,20 +7465,14 @@
         </p:nvSpPr>
         <p:spPr/>
         <p:txBody>
-          <a:bodyPr/>
-          <a:lstStyle/>
-          <a:p>
-            <a:r>
-              <a:rPr lang="en-US" dirty="0"/>
-              <a:t>Senior Software Engineer – </a:t>
-            </a:r>
-            <a:r>
-              <a:rPr lang="en-US" dirty="0" err="1"/>
-              <a:t>NuArx</a:t>
-            </a:r>
-            <a:r>
-              <a:rPr lang="en-US" dirty="0"/>
-              <a:t> Inc.</a:t>
+          <a:bodyPr>
+            <a:normAutofit fontScale="92500" lnSpcReduction="10000"/>
+          </a:bodyPr>
+          <a:lstStyle/>
+          <a:p>
+            <a:r>
+              <a:rPr lang="en-US" dirty="0"/>
+              <a:t>Senior Architect – United Shore</a:t>
             </a:r>
           </a:p>
           <a:p>
@@ -7390,12 +7498,14 @@
         </p:nvSpPr>
         <p:spPr/>
         <p:txBody>
-          <a:bodyPr/>
-          <a:lstStyle/>
-          <a:p>
-            <a:r>
-              <a:rPr lang="en-US" dirty="0"/>
-              <a:t>Professional Developer for 8+ years</a:t>
+          <a:bodyPr>
+            <a:normAutofit fontScale="92500" lnSpcReduction="10000"/>
+          </a:bodyPr>
+          <a:lstStyle/>
+          <a:p>
+            <a:r>
+              <a:rPr lang="en-US" dirty="0"/>
+              <a:t>Professional Developer for 9+ years</a:t>
             </a:r>
           </a:p>
           <a:p>
@@ -7452,6 +7562,13 @@
             <a:r>
               <a:rPr lang="en-US" dirty="0"/>
               <a:t>Cloud</a:t>
+            </a:r>
+          </a:p>
+          <a:p>
+            <a:pPr lvl="1"/>
+            <a:r>
+              <a:rPr lang="en-US" dirty="0"/>
+              <a:t>Machine Learning</a:t>
             </a:r>
           </a:p>
           <a:p>
@@ -7877,15 +7994,7 @@
           <a:p>
             <a:r>
               <a:rPr lang="en-US" dirty="0"/>
-              <a:t>Built from the ground up in </a:t>
-            </a:r>
-            <a:r>
-              <a:rPr lang="en-US" dirty="0" err="1"/>
-              <a:t>.Net</a:t>
-            </a:r>
-            <a:r>
-              <a:rPr lang="en-US" dirty="0"/>
-              <a:t>, not a port</a:t>
+              <a:t>Built from the ground up in .NET, not a port</a:t>
             </a:r>
           </a:p>
           <a:p>
@@ -9006,7 +9115,7 @@
             <a:pPr lvl="1"/>
             <a:r>
               <a:rPr lang="en-US" dirty="0"/>
-              <a:t>Literate</a:t>
+              <a:t>Literate (Console)</a:t>
             </a:r>
           </a:p>
           <a:p>

</xml_diff>

<commit_message>
updated for DevUp 2018
</commit_message>
<xml_diff>
--- a/SerilogLoggingAllGrownUp.pptx
+++ b/SerilogLoggingAllGrownUp.pptx
@@ -130,10 +130,6 @@
 </p:presentation>
 </file>
 
-<file path=ppt/revisionInfo.xml><?xml version="1.0" encoding="utf-8"?>
-<p1510:revInfo xmlns:a="http://schemas.openxmlformats.org/drawingml/2006/main" xmlns:r="http://schemas.openxmlformats.org/officeDocument/2006/relationships" xmlns:p1510="http://schemas.microsoft.com/office/powerpoint/2015/10/main"/>
-</file>
-
 <file path=ppt/notesMasters/notesMaster1.xml><?xml version="1.0" encoding="utf-8"?>
 <p:notesMaster xmlns:a="http://schemas.openxmlformats.org/drawingml/2006/main" xmlns:r="http://schemas.openxmlformats.org/officeDocument/2006/relationships" xmlns:p="http://schemas.openxmlformats.org/presentationml/2006/main">
   <p:cSld>
@@ -216,7 +212,7 @@
           <a:p>
             <a:fld id="{60AEC1D8-3506-41E4-96D2-5486DC5DE0A5}" type="datetimeFigureOut">
               <a:rPr lang="en-US" smtClean="0"/>
-              <a:t>2/20/2018</a:t>
+              <a:t>10/9/2018</a:t>
             </a:fld>
             <a:endParaRPr lang="en-US"/>
           </a:p>
@@ -527,6 +523,90 @@
           <a:bodyPr/>
           <a:lstStyle/>
           <a:p>
+            <a:endParaRPr lang="en-US" dirty="0"/>
+          </a:p>
+        </p:txBody>
+      </p:sp>
+      <p:sp>
+        <p:nvSpPr>
+          <p:cNvPr id="4" name="Slide Number Placeholder 3"/>
+          <p:cNvSpPr>
+            <a:spLocks noGrp="1"/>
+          </p:cNvSpPr>
+          <p:nvPr>
+            <p:ph type="sldNum" sz="quarter" idx="5"/>
+          </p:nvPr>
+        </p:nvSpPr>
+        <p:spPr/>
+        <p:txBody>
+          <a:bodyPr/>
+          <a:lstStyle/>
+          <a:p>
+            <a:fld id="{99E958FF-9FC9-4FAD-9056-CE7C3B104FC2}" type="slidenum">
+              <a:rPr lang="en-US" smtClean="0"/>
+              <a:t>1</a:t>
+            </a:fld>
+            <a:endParaRPr lang="en-US"/>
+          </a:p>
+        </p:txBody>
+      </p:sp>
+    </p:spTree>
+    <p:extLst>
+      <p:ext uri="{BB962C8B-B14F-4D97-AF65-F5344CB8AC3E}">
+        <p14:creationId xmlns:p14="http://schemas.microsoft.com/office/powerpoint/2010/main" val="937377257"/>
+      </p:ext>
+    </p:extLst>
+  </p:cSld>
+  <p:clrMapOvr>
+    <a:masterClrMapping/>
+  </p:clrMapOvr>
+</p:notes>
+</file>
+
+<file path=ppt/notesSlides/notesSlide2.xml><?xml version="1.0" encoding="utf-8"?>
+<p:notes xmlns:a="http://schemas.openxmlformats.org/drawingml/2006/main" xmlns:r="http://schemas.openxmlformats.org/officeDocument/2006/relationships" xmlns:p="http://schemas.openxmlformats.org/presentationml/2006/main">
+  <p:cSld>
+    <p:spTree>
+      <p:nvGrpSpPr>
+        <p:cNvPr id="1" name=""/>
+        <p:cNvGrpSpPr/>
+        <p:nvPr/>
+      </p:nvGrpSpPr>
+      <p:grpSpPr>
+        <a:xfrm>
+          <a:off x="0" y="0"/>
+          <a:ext cx="0" cy="0"/>
+          <a:chOff x="0" y="0"/>
+          <a:chExt cx="0" cy="0"/>
+        </a:xfrm>
+      </p:grpSpPr>
+      <p:sp>
+        <p:nvSpPr>
+          <p:cNvPr id="2" name="Slide Image Placeholder 1"/>
+          <p:cNvSpPr>
+            <a:spLocks noGrp="1" noRot="1" noChangeAspect="1"/>
+          </p:cNvSpPr>
+          <p:nvPr>
+            <p:ph type="sldImg"/>
+          </p:nvPr>
+        </p:nvSpPr>
+        <p:spPr/>
+      </p:sp>
+      <p:sp>
+        <p:nvSpPr>
+          <p:cNvPr id="3" name="Notes Placeholder 2"/>
+          <p:cNvSpPr>
+            <a:spLocks noGrp="1"/>
+          </p:cNvSpPr>
+          <p:nvPr>
+            <p:ph type="body" idx="1"/>
+          </p:nvPr>
+        </p:nvSpPr>
+        <p:spPr/>
+        <p:txBody>
+          <a:bodyPr/>
+          <a:lstStyle/>
+          <a:p>
             <a:r>
               <a:rPr lang="en-US" dirty="0"/>
               <a:t>Getting Started</a:t>
@@ -715,7 +795,7 @@
           <a:p>
             <a:fld id="{48A87A34-81AB-432B-8DAE-1953F412C126}" type="datetimeFigureOut">
               <a:rPr lang="en-US" dirty="0"/>
-              <a:t>2/20/2018</a:t>
+              <a:t>10/9/2018</a:t>
             </a:fld>
             <a:endParaRPr lang="en-US" dirty="0"/>
           </a:p>
@@ -997,7 +1077,7 @@
           <a:p>
             <a:fld id="{48A87A34-81AB-432B-8DAE-1953F412C126}" type="datetimeFigureOut">
               <a:rPr lang="en-US" dirty="0"/>
-              <a:t>2/20/2018</a:t>
+              <a:t>10/9/2018</a:t>
             </a:fld>
             <a:endParaRPr lang="en-US" dirty="0"/>
           </a:p>
@@ -1184,7 +1264,7 @@
           <a:p>
             <a:fld id="{48A87A34-81AB-432B-8DAE-1953F412C126}" type="datetimeFigureOut">
               <a:rPr lang="en-US" dirty="0"/>
-              <a:t>2/20/2018</a:t>
+              <a:t>10/9/2018</a:t>
             </a:fld>
             <a:endParaRPr lang="en-US" dirty="0"/>
           </a:p>
@@ -1440,7 +1520,7 @@
           <a:p>
             <a:fld id="{48A87A34-81AB-432B-8DAE-1953F412C126}" type="datetimeFigureOut">
               <a:rPr lang="en-US" dirty="0"/>
-              <a:t>2/20/2018</a:t>
+              <a:t>10/9/2018</a:t>
             </a:fld>
             <a:endParaRPr lang="en-US" dirty="0"/>
           </a:p>
@@ -1859,7 +1939,7 @@
           <a:p>
             <a:fld id="{48A87A34-81AB-432B-8DAE-1953F412C126}" type="datetimeFigureOut">
               <a:rPr lang="en-US" dirty="0"/>
-              <a:t>2/20/2018</a:t>
+              <a:t>10/9/2018</a:t>
             </a:fld>
             <a:endParaRPr lang="en-US" dirty="0"/>
           </a:p>
@@ -2400,7 +2480,7 @@
           <a:p>
             <a:fld id="{48A87A34-81AB-432B-8DAE-1953F412C126}" type="datetimeFigureOut">
               <a:rPr lang="en-US" dirty="0"/>
-              <a:t>2/20/2018</a:t>
+              <a:t>10/9/2018</a:t>
             </a:fld>
             <a:endParaRPr lang="en-US" dirty="0"/>
           </a:p>
@@ -3235,7 +3315,7 @@
           <a:p>
             <a:fld id="{48A87A34-81AB-432B-8DAE-1953F412C126}" type="datetimeFigureOut">
               <a:rPr lang="en-US" dirty="0"/>
-              <a:t>2/20/2018</a:t>
+              <a:t>10/9/2018</a:t>
             </a:fld>
             <a:endParaRPr lang="en-US" dirty="0"/>
           </a:p>
@@ -3400,7 +3480,7 @@
           <a:p>
             <a:fld id="{48A87A34-81AB-432B-8DAE-1953F412C126}" type="datetimeFigureOut">
               <a:rPr lang="en-US" dirty="0"/>
-              <a:t>2/20/2018</a:t>
+              <a:t>10/9/2018</a:t>
             </a:fld>
             <a:endParaRPr lang="en-US" dirty="0"/>
           </a:p>
@@ -3579,7 +3659,7 @@
           <a:p>
             <a:fld id="{48A87A34-81AB-432B-8DAE-1953F412C126}" type="datetimeFigureOut">
               <a:rPr lang="en-US" dirty="0"/>
-              <a:t>2/20/2018</a:t>
+              <a:t>10/9/2018</a:t>
             </a:fld>
             <a:endParaRPr lang="en-US" dirty="0"/>
           </a:p>
@@ -3744,7 +3824,7 @@
           <a:p>
             <a:fld id="{48A87A34-81AB-432B-8DAE-1953F412C126}" type="datetimeFigureOut">
               <a:rPr lang="en-US" dirty="0"/>
-              <a:t>2/20/2018</a:t>
+              <a:t>10/9/2018</a:t>
             </a:fld>
             <a:endParaRPr lang="en-US" dirty="0"/>
           </a:p>
@@ -3987,7 +4067,7 @@
           <a:p>
             <a:fld id="{48A87A34-81AB-432B-8DAE-1953F412C126}" type="datetimeFigureOut">
               <a:rPr lang="en-US" dirty="0"/>
-              <a:t>2/20/2018</a:t>
+              <a:t>10/9/2018</a:t>
             </a:fld>
             <a:endParaRPr lang="en-US" dirty="0"/>
           </a:p>
@@ -4219,7 +4299,7 @@
           <a:p>
             <a:fld id="{48A87A34-81AB-432B-8DAE-1953F412C126}" type="datetimeFigureOut">
               <a:rPr lang="en-US" dirty="0"/>
-              <a:t>2/20/2018</a:t>
+              <a:t>10/9/2018</a:t>
             </a:fld>
             <a:endParaRPr lang="en-US" dirty="0"/>
           </a:p>
@@ -4587,7 +4667,7 @@
           <a:p>
             <a:fld id="{48A87A34-81AB-432B-8DAE-1953F412C126}" type="datetimeFigureOut">
               <a:rPr lang="en-US" dirty="0"/>
-              <a:t>2/20/2018</a:t>
+              <a:t>10/9/2018</a:t>
             </a:fld>
             <a:endParaRPr lang="en-US" dirty="0"/>
           </a:p>
@@ -4700,7 +4780,7 @@
           <a:p>
             <a:fld id="{48A87A34-81AB-432B-8DAE-1953F412C126}" type="datetimeFigureOut">
               <a:rPr lang="en-US" dirty="0"/>
-              <a:t>2/20/2018</a:t>
+              <a:t>10/9/2018</a:t>
             </a:fld>
             <a:endParaRPr lang="en-US" dirty="0"/>
           </a:p>
@@ -4790,7 +4870,7 @@
           <a:p>
             <a:fld id="{48A87A34-81AB-432B-8DAE-1953F412C126}" type="datetimeFigureOut">
               <a:rPr lang="en-US" dirty="0"/>
-              <a:t>2/20/2018</a:t>
+              <a:t>10/9/2018</a:t>
             </a:fld>
             <a:endParaRPr lang="en-US" dirty="0"/>
           </a:p>
@@ -5036,7 +5116,7 @@
           <a:p>
             <a:fld id="{48A87A34-81AB-432B-8DAE-1953F412C126}" type="datetimeFigureOut">
               <a:rPr lang="en-US" dirty="0"/>
-              <a:t>2/20/2018</a:t>
+              <a:t>10/9/2018</a:t>
             </a:fld>
             <a:endParaRPr lang="en-US" dirty="0"/>
           </a:p>
@@ -5318,7 +5398,7 @@
           <a:p>
             <a:fld id="{48A87A34-81AB-432B-8DAE-1953F412C126}" type="datetimeFigureOut">
               <a:rPr lang="en-US" dirty="0"/>
-              <a:t>2/20/2018</a:t>
+              <a:t>10/9/2018</a:t>
             </a:fld>
             <a:endParaRPr lang="en-US" dirty="0"/>
           </a:p>
@@ -5527,7 +5607,7 @@
             <a:fld id="{48A87A34-81AB-432B-8DAE-1953F412C126}" type="datetimeFigureOut">
               <a:rPr lang="en-US" dirty="0"/>
               <a:pPr/>
-              <a:t>2/20/2018</a:t>
+              <a:t>10/9/2018</a:t>
             </a:fld>
             <a:endParaRPr lang="en-US" dirty="0"/>
           </a:p>
@@ -7116,7 +7196,7 @@
           <a:p>
             <a:r>
               <a:rPr lang="en-US" dirty="0"/>
-              <a:t>Advanced</a:t>
+              <a:t>ASYNCHRONOUS LOGGING</a:t>
             </a:r>
           </a:p>
         </p:txBody>
@@ -7139,22 +7219,140 @@
         </p:nvSpPr>
         <p:spPr/>
         <p:txBody>
-          <a:bodyPr/>
+          <a:bodyPr>
+            <a:normAutofit fontScale="92500" lnSpcReduction="10000"/>
+          </a:bodyPr>
           <a:lstStyle/>
           <a:p>
             <a:r>
-              <a:rPr lang="en-US" dirty="0"/>
-              <a:t>.NET Core &amp; ASP .NET Core</a:t>
-            </a:r>
-          </a:p>
-          <a:p>
-            <a:r>
-              <a:rPr lang="en-US" dirty="0"/>
-              <a:t>Asynchronous Logging</a:t>
-            </a:r>
-          </a:p>
-          <a:p>
+              <a:rPr lang="en-US" dirty="0" err="1"/>
+              <a:t>NuGets</a:t>
+            </a:r>
             <a:endParaRPr lang="en-US" dirty="0"/>
+          </a:p>
+          <a:p>
+            <a:pPr lvl="1"/>
+            <a:r>
+              <a:rPr lang="en-US" dirty="0" err="1"/>
+              <a:t>Serilog.Sinks.Async</a:t>
+            </a:r>
+            <a:r>
+              <a:rPr lang="en-US" dirty="0"/>
+              <a:t> – provides asynchronous wrapper for </a:t>
+            </a:r>
+            <a:r>
+              <a:rPr lang="en-US" dirty="0" err="1"/>
+              <a:t>Serilog</a:t>
+            </a:r>
+            <a:r>
+              <a:rPr lang="en-US" dirty="0"/>
+              <a:t> sinks (delegated to work on a background thread)</a:t>
+            </a:r>
+          </a:p>
+          <a:p>
+            <a:pPr lvl="1"/>
+            <a:r>
+              <a:rPr lang="en-US" dirty="0" err="1"/>
+              <a:t>Serilog.Sinks.AsyncRollingFile</a:t>
+            </a:r>
+            <a:r>
+              <a:rPr lang="en-US" dirty="0"/>
+              <a:t> – provides better asynchronous handling of log files</a:t>
+            </a:r>
+          </a:p>
+          <a:p>
+            <a:r>
+              <a:rPr lang="en-US" dirty="0"/>
+              <a:t>Example</a:t>
+            </a:r>
+          </a:p>
+          <a:p>
+            <a:pPr marL="0" indent="0">
+              <a:buNone/>
+            </a:pPr>
+            <a:r>
+              <a:rPr lang="en-US" sz="1900" dirty="0" err="1"/>
+              <a:t>Log.Logger</a:t>
+            </a:r>
+            <a:r>
+              <a:rPr lang="en-US" sz="1900" dirty="0"/>
+              <a:t> = new </a:t>
+            </a:r>
+            <a:r>
+              <a:rPr lang="en-US" sz="1900" dirty="0" err="1"/>
+              <a:t>LoggerConfiguration</a:t>
+            </a:r>
+            <a:r>
+              <a:rPr lang="en-US" sz="1900" dirty="0"/>
+              <a:t>()  </a:t>
+            </a:r>
+          </a:p>
+          <a:p>
+            <a:pPr marL="0" indent="0">
+              <a:buNone/>
+            </a:pPr>
+            <a:r>
+              <a:rPr lang="en-US" sz="1900" dirty="0"/>
+              <a:t>       .</a:t>
+            </a:r>
+            <a:r>
+              <a:rPr lang="en-US" sz="1900" dirty="0" err="1"/>
+              <a:t>WriteTo.Async</a:t>
+            </a:r>
+            <a:r>
+              <a:rPr lang="en-US" sz="1900" dirty="0"/>
+              <a:t>(x =&gt; </a:t>
+            </a:r>
+            <a:r>
+              <a:rPr lang="en-US" sz="1900" dirty="0" err="1"/>
+              <a:t>x.LiterateConsole</a:t>
+            </a:r>
+            <a:r>
+              <a:rPr lang="en-US" sz="1900" dirty="0"/>
+              <a:t>()</a:t>
+            </a:r>
+          </a:p>
+          <a:p>
+            <a:pPr marL="0" indent="0">
+              <a:buNone/>
+            </a:pPr>
+            <a:r>
+              <a:rPr lang="en-US" sz="1900" dirty="0"/>
+              <a:t>       .</a:t>
+            </a:r>
+            <a:r>
+              <a:rPr lang="en-US" sz="1900" dirty="0" err="1"/>
+              <a:t>WriteTo.Async</a:t>
+            </a:r>
+            <a:r>
+              <a:rPr lang="en-US" sz="1900" dirty="0"/>
+              <a:t>(x=&gt;</a:t>
+            </a:r>
+            <a:r>
+              <a:rPr lang="en-US" sz="1900" dirty="0" err="1"/>
+              <a:t>x.RollingFile</a:t>
+            </a:r>
+            <a:r>
+              <a:rPr lang="en-US" sz="1900" dirty="0"/>
+              <a:t>(“logs/log.txt”)</a:t>
+            </a:r>
+          </a:p>
+          <a:p>
+            <a:pPr marL="0" indent="0">
+              <a:buNone/>
+            </a:pPr>
+            <a:r>
+              <a:rPr lang="en-US" sz="1900" dirty="0"/>
+              <a:t>       .</a:t>
+            </a:r>
+            <a:r>
+              <a:rPr lang="en-US" sz="1900" dirty="0" err="1"/>
+              <a:t>CreateLogger</a:t>
+            </a:r>
+            <a:r>
+              <a:rPr lang="en-US" sz="1900" dirty="0"/>
+              <a:t>();</a:t>
+            </a:r>
           </a:p>
           <a:p>
             <a:endParaRPr lang="en-US" dirty="0"/>
@@ -7171,6 +7369,320 @@
   <p:clrMapOvr>
     <a:masterClrMapping/>
   </p:clrMapOvr>
+  <p:timing>
+    <p:tnLst>
+      <p:par>
+        <p:cTn id="1" dur="indefinite" restart="never" nodeType="tmRoot">
+          <p:childTnLst>
+            <p:seq concurrent="1" nextAc="seek">
+              <p:cTn id="2" dur="indefinite" nodeType="mainSeq">
+                <p:childTnLst>
+                  <p:par>
+                    <p:cTn id="3" fill="hold">
+                      <p:stCondLst>
+                        <p:cond delay="indefinite"/>
+                      </p:stCondLst>
+                      <p:childTnLst>
+                        <p:par>
+                          <p:cTn id="4" fill="hold">
+                            <p:stCondLst>
+                              <p:cond delay="0"/>
+                            </p:stCondLst>
+                            <p:childTnLst>
+                              <p:par>
+                                <p:cTn id="5" presetID="1" presetClass="entr" presetSubtype="0" fill="hold" nodeType="clickEffect">
+                                  <p:stCondLst>
+                                    <p:cond delay="0"/>
+                                  </p:stCondLst>
+                                  <p:childTnLst>
+                                    <p:set>
+                                      <p:cBhvr>
+                                        <p:cTn id="6" dur="1" fill="hold">
+                                          <p:stCondLst>
+                                            <p:cond delay="0"/>
+                                          </p:stCondLst>
+                                        </p:cTn>
+                                        <p:tgtEl>
+                                          <p:spTgt spid="3">
+                                            <p:txEl>
+                                              <p:pRg st="0" end="0"/>
+                                            </p:txEl>
+                                          </p:spTgt>
+                                        </p:tgtEl>
+                                        <p:attrNameLst>
+                                          <p:attrName>style.visibility</p:attrName>
+                                        </p:attrNameLst>
+                                      </p:cBhvr>
+                                      <p:to>
+                                        <p:strVal val="visible"/>
+                                      </p:to>
+                                    </p:set>
+                                  </p:childTnLst>
+                                </p:cTn>
+                              </p:par>
+                              <p:par>
+                                <p:cTn id="7" presetID="1" presetClass="entr" presetSubtype="0" fill="hold" nodeType="withEffect">
+                                  <p:stCondLst>
+                                    <p:cond delay="0"/>
+                                  </p:stCondLst>
+                                  <p:childTnLst>
+                                    <p:set>
+                                      <p:cBhvr>
+                                        <p:cTn id="8" dur="1" fill="hold">
+                                          <p:stCondLst>
+                                            <p:cond delay="0"/>
+                                          </p:stCondLst>
+                                        </p:cTn>
+                                        <p:tgtEl>
+                                          <p:spTgt spid="3">
+                                            <p:txEl>
+                                              <p:pRg st="1" end="1"/>
+                                            </p:txEl>
+                                          </p:spTgt>
+                                        </p:tgtEl>
+                                        <p:attrNameLst>
+                                          <p:attrName>style.visibility</p:attrName>
+                                        </p:attrNameLst>
+                                      </p:cBhvr>
+                                      <p:to>
+                                        <p:strVal val="visible"/>
+                                      </p:to>
+                                    </p:set>
+                                  </p:childTnLst>
+                                </p:cTn>
+                              </p:par>
+                              <p:par>
+                                <p:cTn id="9" presetID="1" presetClass="entr" presetSubtype="0" fill="hold" nodeType="withEffect">
+                                  <p:stCondLst>
+                                    <p:cond delay="0"/>
+                                  </p:stCondLst>
+                                  <p:childTnLst>
+                                    <p:set>
+                                      <p:cBhvr>
+                                        <p:cTn id="10" dur="1" fill="hold">
+                                          <p:stCondLst>
+                                            <p:cond delay="0"/>
+                                          </p:stCondLst>
+                                        </p:cTn>
+                                        <p:tgtEl>
+                                          <p:spTgt spid="3">
+                                            <p:txEl>
+                                              <p:pRg st="2" end="2"/>
+                                            </p:txEl>
+                                          </p:spTgt>
+                                        </p:tgtEl>
+                                        <p:attrNameLst>
+                                          <p:attrName>style.visibility</p:attrName>
+                                        </p:attrNameLst>
+                                      </p:cBhvr>
+                                      <p:to>
+                                        <p:strVal val="visible"/>
+                                      </p:to>
+                                    </p:set>
+                                  </p:childTnLst>
+                                </p:cTn>
+                              </p:par>
+                            </p:childTnLst>
+                          </p:cTn>
+                        </p:par>
+                      </p:childTnLst>
+                    </p:cTn>
+                  </p:par>
+                  <p:par>
+                    <p:cTn id="11" fill="hold">
+                      <p:stCondLst>
+                        <p:cond delay="indefinite"/>
+                      </p:stCondLst>
+                      <p:childTnLst>
+                        <p:par>
+                          <p:cTn id="12" fill="hold">
+                            <p:stCondLst>
+                              <p:cond delay="0"/>
+                            </p:stCondLst>
+                            <p:childTnLst>
+                              <p:par>
+                                <p:cTn id="13" presetID="1" presetClass="entr" presetSubtype="0" fill="hold" nodeType="clickEffect">
+                                  <p:stCondLst>
+                                    <p:cond delay="0"/>
+                                  </p:stCondLst>
+                                  <p:childTnLst>
+                                    <p:set>
+                                      <p:cBhvr>
+                                        <p:cTn id="14" dur="1" fill="hold">
+                                          <p:stCondLst>
+                                            <p:cond delay="0"/>
+                                          </p:stCondLst>
+                                        </p:cTn>
+                                        <p:tgtEl>
+                                          <p:spTgt spid="3">
+                                            <p:txEl>
+                                              <p:pRg st="3" end="3"/>
+                                            </p:txEl>
+                                          </p:spTgt>
+                                        </p:tgtEl>
+                                        <p:attrNameLst>
+                                          <p:attrName>style.visibility</p:attrName>
+                                        </p:attrNameLst>
+                                      </p:cBhvr>
+                                      <p:to>
+                                        <p:strVal val="visible"/>
+                                      </p:to>
+                                    </p:set>
+                                  </p:childTnLst>
+                                </p:cTn>
+                              </p:par>
+                              <p:par>
+                                <p:cTn id="15" presetID="1" presetClass="entr" presetSubtype="0" fill="hold" nodeType="withEffect">
+                                  <p:stCondLst>
+                                    <p:cond delay="0"/>
+                                  </p:stCondLst>
+                                  <p:childTnLst>
+                                    <p:set>
+                                      <p:cBhvr>
+                                        <p:cTn id="16" dur="1" fill="hold">
+                                          <p:stCondLst>
+                                            <p:cond delay="0"/>
+                                          </p:stCondLst>
+                                        </p:cTn>
+                                        <p:tgtEl>
+                                          <p:spTgt spid="3">
+                                            <p:txEl>
+                                              <p:pRg st="4" end="4"/>
+                                            </p:txEl>
+                                          </p:spTgt>
+                                        </p:tgtEl>
+                                        <p:attrNameLst>
+                                          <p:attrName>style.visibility</p:attrName>
+                                        </p:attrNameLst>
+                                      </p:cBhvr>
+                                      <p:to>
+                                        <p:strVal val="visible"/>
+                                      </p:to>
+                                    </p:set>
+                                  </p:childTnLst>
+                                </p:cTn>
+                              </p:par>
+                              <p:par>
+                                <p:cTn id="17" presetID="1" presetClass="entr" presetSubtype="0" fill="hold" nodeType="withEffect">
+                                  <p:stCondLst>
+                                    <p:cond delay="0"/>
+                                  </p:stCondLst>
+                                  <p:childTnLst>
+                                    <p:set>
+                                      <p:cBhvr>
+                                        <p:cTn id="18" dur="1" fill="hold">
+                                          <p:stCondLst>
+                                            <p:cond delay="0"/>
+                                          </p:stCondLst>
+                                        </p:cTn>
+                                        <p:tgtEl>
+                                          <p:spTgt spid="3">
+                                            <p:txEl>
+                                              <p:pRg st="5" end="5"/>
+                                            </p:txEl>
+                                          </p:spTgt>
+                                        </p:tgtEl>
+                                        <p:attrNameLst>
+                                          <p:attrName>style.visibility</p:attrName>
+                                        </p:attrNameLst>
+                                      </p:cBhvr>
+                                      <p:to>
+                                        <p:strVal val="visible"/>
+                                      </p:to>
+                                    </p:set>
+                                  </p:childTnLst>
+                                </p:cTn>
+                              </p:par>
+                              <p:par>
+                                <p:cTn id="19" presetID="1" presetClass="entr" presetSubtype="0" fill="hold" nodeType="withEffect">
+                                  <p:stCondLst>
+                                    <p:cond delay="0"/>
+                                  </p:stCondLst>
+                                  <p:childTnLst>
+                                    <p:set>
+                                      <p:cBhvr>
+                                        <p:cTn id="20" dur="1" fill="hold">
+                                          <p:stCondLst>
+                                            <p:cond delay="0"/>
+                                          </p:stCondLst>
+                                        </p:cTn>
+                                        <p:tgtEl>
+                                          <p:spTgt spid="3">
+                                            <p:txEl>
+                                              <p:pRg st="6" end="6"/>
+                                            </p:txEl>
+                                          </p:spTgt>
+                                        </p:tgtEl>
+                                        <p:attrNameLst>
+                                          <p:attrName>style.visibility</p:attrName>
+                                        </p:attrNameLst>
+                                      </p:cBhvr>
+                                      <p:to>
+                                        <p:strVal val="visible"/>
+                                      </p:to>
+                                    </p:set>
+                                  </p:childTnLst>
+                                </p:cTn>
+                              </p:par>
+                              <p:par>
+                                <p:cTn id="21" presetID="1" presetClass="entr" presetSubtype="0" fill="hold" nodeType="withEffect">
+                                  <p:stCondLst>
+                                    <p:cond delay="0"/>
+                                  </p:stCondLst>
+                                  <p:childTnLst>
+                                    <p:set>
+                                      <p:cBhvr>
+                                        <p:cTn id="22" dur="1" fill="hold">
+                                          <p:stCondLst>
+                                            <p:cond delay="0"/>
+                                          </p:stCondLst>
+                                        </p:cTn>
+                                        <p:tgtEl>
+                                          <p:spTgt spid="3">
+                                            <p:txEl>
+                                              <p:pRg st="7" end="7"/>
+                                            </p:txEl>
+                                          </p:spTgt>
+                                        </p:tgtEl>
+                                        <p:attrNameLst>
+                                          <p:attrName>style.visibility</p:attrName>
+                                        </p:attrNameLst>
+                                      </p:cBhvr>
+                                      <p:to>
+                                        <p:strVal val="visible"/>
+                                      </p:to>
+                                    </p:set>
+                                  </p:childTnLst>
+                                </p:cTn>
+                              </p:par>
+                            </p:childTnLst>
+                          </p:cTn>
+                        </p:par>
+                      </p:childTnLst>
+                    </p:cTn>
+                  </p:par>
+                </p:childTnLst>
+              </p:cTn>
+              <p:prevCondLst>
+                <p:cond evt="onPrev" delay="0">
+                  <p:tgtEl>
+                    <p:sldTgt/>
+                  </p:tgtEl>
+                </p:cond>
+              </p:prevCondLst>
+              <p:nextCondLst>
+                <p:cond evt="onNext" delay="0">
+                  <p:tgtEl>
+                    <p:sldTgt/>
+                  </p:tgtEl>
+                </p:cond>
+              </p:nextCondLst>
+            </p:seq>
+          </p:childTnLst>
+        </p:cTn>
+      </p:par>
+    </p:tnLst>
+  </p:timing>
 </p:sld>
 </file>
 

</xml_diff>